<commit_message>
Updates made at SQL Sat Columbus
</commit_message>
<xml_diff>
--- a/SQL Sat 1058 -Columbus OH/Intro to Powershell/Intro to Powershell.pptx
+++ b/SQL Sat 1058 -Columbus OH/Intro to Powershell/Intro to Powershell.pptx
@@ -5,7 +5,7 @@
     <p:sldMasterId id="2147483648" r:id="rId1"/>
   </p:sldMasterIdLst>
   <p:notesMasterIdLst>
-    <p:notesMasterId r:id="rId25"/>
+    <p:notesMasterId r:id="rId26"/>
   </p:notesMasterIdLst>
   <p:sldIdLst>
     <p:sldId id="256" r:id="rId2"/>
@@ -31,23 +31,24 @@
     <p:sldId id="282" r:id="rId22"/>
     <p:sldId id="283" r:id="rId23"/>
     <p:sldId id="284" r:id="rId24"/>
+    <p:sldId id="285" r:id="rId25"/>
   </p:sldIdLst>
   <p:sldSz cx="12192000" cy="6858000"/>
   <p:notesSz cx="6858000" cy="9144000"/>
   <p:embeddedFontLst>
     <p:embeddedFont>
       <p:font typeface="Calibri" panose="020F0502020204030204" pitchFamily="34" charset="0"/>
-      <p:regular r:id="rId26"/>
-      <p:bold r:id="rId27"/>
-      <p:italic r:id="rId28"/>
-      <p:boldItalic r:id="rId29"/>
+      <p:regular r:id="rId27"/>
+      <p:bold r:id="rId28"/>
+      <p:italic r:id="rId29"/>
+      <p:boldItalic r:id="rId30"/>
     </p:embeddedFont>
     <p:embeddedFont>
       <p:font typeface="Roboto" panose="02000000000000000000" pitchFamily="2" charset="0"/>
-      <p:regular r:id="rId30"/>
-      <p:bold r:id="rId31"/>
-      <p:italic r:id="rId32"/>
-      <p:boldItalic r:id="rId33"/>
+      <p:regular r:id="rId31"/>
+      <p:bold r:id="rId32"/>
+      <p:italic r:id="rId33"/>
+      <p:boldItalic r:id="rId34"/>
     </p:embeddedFont>
   </p:embeddedFontLst>
   <p:defaultTextStyle>
@@ -284,7 +285,7 @@
       <p15:sldGuideLst xmlns:p15="http://schemas.microsoft.com/office/powerpoint/2012/main"/>
     </p:ext>
     <p:ext uri="http://customooxmlschemas.google.com/">
-      <go:slidesCustomData xmlns:go="http://customooxmlschemas.google.com/" xmlns:ahyp="http://schemas.microsoft.com/office/drawing/2018/hyperlinkcolor" xmlns:p15="http://schemas.microsoft.com/office/powerpoint/2012/main" xmlns:p14="http://schemas.microsoft.com/office/powerpoint/2010/main" xmlns:com="http://schemas.openxmlformats.org/drawingml/2006/compatibility" xmlns:pvml="urn:schemas-microsoft-com:office:powerpoint" xmlns:v="urn:schemas-microsoft-com:vml" xmlns:o="urn:schemas-microsoft-com:office:office" xmlns:dgm="http://schemas.openxmlformats.org/drawingml/2006/diagram" xmlns:c="http://schemas.openxmlformats.org/drawingml/2006/chart" xmlns:mv="urn:schemas-microsoft-com:mac:vml" xmlns:mc="http://schemas.openxmlformats.org/markup-compatibility/2006" xmlns="" r:id="rId39" roundtripDataSignature="AMtx7mgObtSRP4Y3aSux5NQfV29+0LOS3w=="/>
+      <go:slidesCustomData xmlns="" xmlns:mc="http://schemas.openxmlformats.org/markup-compatibility/2006" xmlns:mv="urn:schemas-microsoft-com:mac:vml" xmlns:c="http://schemas.openxmlformats.org/drawingml/2006/chart" xmlns:dgm="http://schemas.openxmlformats.org/drawingml/2006/diagram" xmlns:o="urn:schemas-microsoft-com:office:office" xmlns:v="urn:schemas-microsoft-com:vml" xmlns:pvml="urn:schemas-microsoft-com:office:powerpoint" xmlns:com="http://schemas.openxmlformats.org/drawingml/2006/compatibility" xmlns:p14="http://schemas.microsoft.com/office/powerpoint/2010/main" xmlns:p15="http://schemas.microsoft.com/office/powerpoint/2012/main" xmlns:ahyp="http://schemas.microsoft.com/office/drawing/2018/hyperlinkcolor" xmlns:go="http://customooxmlschemas.google.com/" r:id="rId39" roundtripDataSignature="AMtx7mgObtSRP4Y3aSux5NQfV29+0LOS3w=="/>
     </p:ext>
   </p:extLst>
 </p:presentation>
@@ -307,7 +308,7 @@
         <p15:threadingInfo xmlns:p15="http://schemas.microsoft.com/office/powerpoint/2012/main" timeZoneBias="0"/>
       </p:ext>
       <p:ext uri="http://customooxmlschemas.google.com/">
-        <go:slidesCustomData xmlns:go="http://customooxmlschemas.google.com/" xmlns:ahyp="http://schemas.microsoft.com/office/drawing/2018/hyperlinkcolor" xmlns:p15="http://schemas.microsoft.com/office/powerpoint/2012/main" xmlns:p14="http://schemas.microsoft.com/office/powerpoint/2010/main" xmlns:com="http://schemas.openxmlformats.org/drawingml/2006/compatibility" xmlns:pvml="urn:schemas-microsoft-com:office:powerpoint" xmlns:v="urn:schemas-microsoft-com:vml" xmlns:o="urn:schemas-microsoft-com:office:office" xmlns:dgm="http://schemas.openxmlformats.org/drawingml/2006/diagram" xmlns:c="http://schemas.openxmlformats.org/drawingml/2006/chart" xmlns:mv="urn:schemas-microsoft-com:mac:vml" xmlns:mc="http://schemas.openxmlformats.org/markup-compatibility/2006" xmlns="" commentPostId="AAAAsEWYE8g"/>
+        <go:slidesCustomData xmlns="" xmlns:mc="http://schemas.openxmlformats.org/markup-compatibility/2006" xmlns:mv="urn:schemas-microsoft-com:mac:vml" xmlns:c="http://schemas.openxmlformats.org/drawingml/2006/chart" xmlns:dgm="http://schemas.openxmlformats.org/drawingml/2006/diagram" xmlns:o="urn:schemas-microsoft-com:office:office" xmlns:v="urn:schemas-microsoft-com:vml" xmlns:pvml="urn:schemas-microsoft-com:office:powerpoint" xmlns:com="http://schemas.openxmlformats.org/drawingml/2006/compatibility" xmlns:p14="http://schemas.microsoft.com/office/powerpoint/2010/main" xmlns:p15="http://schemas.microsoft.com/office/powerpoint/2012/main" xmlns:ahyp="http://schemas.microsoft.com/office/drawing/2018/hyperlinkcolor" xmlns:go="http://customooxmlschemas.google.com/" commentPostId="AAAAsEWYE8g"/>
       </p:ext>
     </p:extLst>
   </p:cm>
@@ -322,7 +323,7 @@
         </p15:threadingInfo>
       </p:ext>
       <p:ext uri="http://customooxmlschemas.google.com/">
-        <go:slidesCustomData xmlns:go="http://customooxmlschemas.google.com/" xmlns:ahyp="http://schemas.microsoft.com/office/drawing/2018/hyperlinkcolor" xmlns:p15="http://schemas.microsoft.com/office/powerpoint/2012/main" xmlns:p14="http://schemas.microsoft.com/office/powerpoint/2010/main" xmlns:com="http://schemas.openxmlformats.org/drawingml/2006/compatibility" xmlns:pvml="urn:schemas-microsoft-com:office:powerpoint" xmlns:v="urn:schemas-microsoft-com:vml" xmlns:o="urn:schemas-microsoft-com:office:office" xmlns:dgm="http://schemas.openxmlformats.org/drawingml/2006/diagram" xmlns:c="http://schemas.openxmlformats.org/drawingml/2006/chart" xmlns:mv="urn:schemas-microsoft-com:mac:vml" xmlns:mc="http://schemas.openxmlformats.org/markup-compatibility/2006" xmlns="" commentPostId="AAAAsAIqEF8"/>
+        <go:slidesCustomData xmlns="" xmlns:mc="http://schemas.openxmlformats.org/markup-compatibility/2006" xmlns:mv="urn:schemas-microsoft-com:mac:vml" xmlns:c="http://schemas.openxmlformats.org/drawingml/2006/chart" xmlns:dgm="http://schemas.openxmlformats.org/drawingml/2006/diagram" xmlns:o="urn:schemas-microsoft-com:office:office" xmlns:v="urn:schemas-microsoft-com:vml" xmlns:pvml="urn:schemas-microsoft-com:office:powerpoint" xmlns:com="http://schemas.openxmlformats.org/drawingml/2006/compatibility" xmlns:p14="http://schemas.microsoft.com/office/powerpoint/2010/main" xmlns:p15="http://schemas.microsoft.com/office/powerpoint/2012/main" xmlns:ahyp="http://schemas.microsoft.com/office/drawing/2018/hyperlinkcolor" xmlns:go="http://customooxmlschemas.google.com/" commentPostId="AAAAsAIqEF8"/>
       </p:ext>
     </p:extLst>
   </p:cm>
@@ -340,7 +341,7 @@
         <p15:threadingInfo xmlns:p15="http://schemas.microsoft.com/office/powerpoint/2012/main" timeZoneBias="0"/>
       </p:ext>
       <p:ext uri="http://customooxmlschemas.google.com/">
-        <go:slidesCustomData xmlns:go="http://customooxmlschemas.google.com/" xmlns:ahyp="http://schemas.microsoft.com/office/drawing/2018/hyperlinkcolor" xmlns:p15="http://schemas.microsoft.com/office/powerpoint/2012/main" xmlns:p14="http://schemas.microsoft.com/office/powerpoint/2010/main" xmlns:com="http://schemas.openxmlformats.org/drawingml/2006/compatibility" xmlns:pvml="urn:schemas-microsoft-com:office:powerpoint" xmlns:v="urn:schemas-microsoft-com:vml" xmlns:o="urn:schemas-microsoft-com:office:office" xmlns:dgm="http://schemas.openxmlformats.org/drawingml/2006/diagram" xmlns:c="http://schemas.openxmlformats.org/drawingml/2006/chart" xmlns:mv="urn:schemas-microsoft-com:mac:vml" xmlns:mc="http://schemas.openxmlformats.org/markup-compatibility/2006" xmlns="" commentPostId="AAAAsEWYE8k"/>
+        <go:slidesCustomData xmlns="" xmlns:mc="http://schemas.openxmlformats.org/markup-compatibility/2006" xmlns:mv="urn:schemas-microsoft-com:mac:vml" xmlns:c="http://schemas.openxmlformats.org/drawingml/2006/chart" xmlns:dgm="http://schemas.openxmlformats.org/drawingml/2006/diagram" xmlns:o="urn:schemas-microsoft-com:office:office" xmlns:v="urn:schemas-microsoft-com:vml" xmlns:pvml="urn:schemas-microsoft-com:office:powerpoint" xmlns:com="http://schemas.openxmlformats.org/drawingml/2006/compatibility" xmlns:p14="http://schemas.microsoft.com/office/powerpoint/2010/main" xmlns:p15="http://schemas.microsoft.com/office/powerpoint/2012/main" xmlns:ahyp="http://schemas.microsoft.com/office/drawing/2018/hyperlinkcolor" xmlns:go="http://customooxmlschemas.google.com/" commentPostId="AAAAsEWYE8k"/>
       </p:ext>
     </p:extLst>
   </p:cm>
@@ -355,7 +356,7 @@
         </p15:threadingInfo>
       </p:ext>
       <p:ext uri="http://customooxmlschemas.google.com/">
-        <go:slidesCustomData xmlns:go="http://customooxmlschemas.google.com/" xmlns:ahyp="http://schemas.microsoft.com/office/drawing/2018/hyperlinkcolor" xmlns:p15="http://schemas.microsoft.com/office/powerpoint/2012/main" xmlns:p14="http://schemas.microsoft.com/office/powerpoint/2010/main" xmlns:com="http://schemas.openxmlformats.org/drawingml/2006/compatibility" xmlns:pvml="urn:schemas-microsoft-com:office:powerpoint" xmlns:v="urn:schemas-microsoft-com:vml" xmlns:o="urn:schemas-microsoft-com:office:office" xmlns:dgm="http://schemas.openxmlformats.org/drawingml/2006/diagram" xmlns:c="http://schemas.openxmlformats.org/drawingml/2006/chart" xmlns:mv="urn:schemas-microsoft-com:mac:vml" xmlns:mc="http://schemas.openxmlformats.org/markup-compatibility/2006" xmlns="" commentPostId="AAAAsAIqEGA"/>
+        <go:slidesCustomData xmlns="" xmlns:mc="http://schemas.openxmlformats.org/markup-compatibility/2006" xmlns:mv="urn:schemas-microsoft-com:mac:vml" xmlns:c="http://schemas.openxmlformats.org/drawingml/2006/chart" xmlns:dgm="http://schemas.openxmlformats.org/drawingml/2006/diagram" xmlns:o="urn:schemas-microsoft-com:office:office" xmlns:v="urn:schemas-microsoft-com:vml" xmlns:pvml="urn:schemas-microsoft-com:office:powerpoint" xmlns:com="http://schemas.openxmlformats.org/drawingml/2006/compatibility" xmlns:p14="http://schemas.microsoft.com/office/powerpoint/2010/main" xmlns:p15="http://schemas.microsoft.com/office/powerpoint/2012/main" xmlns:ahyp="http://schemas.microsoft.com/office/drawing/2018/hyperlinkcolor" xmlns:go="http://customooxmlschemas.google.com/" commentPostId="AAAAsAIqEGA"/>
       </p:ext>
     </p:extLst>
   </p:cm>
@@ -372,7 +373,7 @@
         <p15:threadingInfo xmlns:p15="http://schemas.microsoft.com/office/powerpoint/2012/main" timeZoneBias="0"/>
       </p:ext>
       <p:ext uri="http://customooxmlschemas.google.com/">
-        <go:slidesCustomData xmlns:go="http://customooxmlschemas.google.com/" xmlns:ahyp="http://schemas.microsoft.com/office/drawing/2018/hyperlinkcolor" xmlns:p15="http://schemas.microsoft.com/office/powerpoint/2012/main" xmlns:p14="http://schemas.microsoft.com/office/powerpoint/2010/main" xmlns:com="http://schemas.openxmlformats.org/drawingml/2006/compatibility" xmlns:pvml="urn:schemas-microsoft-com:office:powerpoint" xmlns:v="urn:schemas-microsoft-com:vml" xmlns:o="urn:schemas-microsoft-com:office:office" xmlns:dgm="http://schemas.openxmlformats.org/drawingml/2006/diagram" xmlns:c="http://schemas.openxmlformats.org/drawingml/2006/chart" xmlns:mv="urn:schemas-microsoft-com:mac:vml" xmlns:mc="http://schemas.openxmlformats.org/markup-compatibility/2006" xmlns="" commentPostId="AAAAsEWYE8o"/>
+        <go:slidesCustomData xmlns="" xmlns:mc="http://schemas.openxmlformats.org/markup-compatibility/2006" xmlns:mv="urn:schemas-microsoft-com:mac:vml" xmlns:c="http://schemas.openxmlformats.org/drawingml/2006/chart" xmlns:dgm="http://schemas.openxmlformats.org/drawingml/2006/diagram" xmlns:o="urn:schemas-microsoft-com:office:office" xmlns:v="urn:schemas-microsoft-com:vml" xmlns:pvml="urn:schemas-microsoft-com:office:powerpoint" xmlns:com="http://schemas.openxmlformats.org/drawingml/2006/compatibility" xmlns:p14="http://schemas.microsoft.com/office/powerpoint/2010/main" xmlns:p15="http://schemas.microsoft.com/office/powerpoint/2012/main" xmlns:ahyp="http://schemas.microsoft.com/office/drawing/2018/hyperlinkcolor" xmlns:go="http://customooxmlschemas.google.com/" commentPostId="AAAAsEWYE8o"/>
       </p:ext>
     </p:extLst>
   </p:cm>
@@ -389,7 +390,7 @@
         <p15:threadingInfo xmlns:p15="http://schemas.microsoft.com/office/powerpoint/2012/main" timeZoneBias="0"/>
       </p:ext>
       <p:ext uri="http://customooxmlschemas.google.com/">
-        <go:slidesCustomData xmlns:go="http://customooxmlschemas.google.com/" xmlns:ahyp="http://schemas.microsoft.com/office/drawing/2018/hyperlinkcolor" xmlns:p15="http://schemas.microsoft.com/office/powerpoint/2012/main" xmlns:p14="http://schemas.microsoft.com/office/powerpoint/2010/main" xmlns:com="http://schemas.openxmlformats.org/drawingml/2006/compatibility" xmlns:pvml="urn:schemas-microsoft-com:office:powerpoint" xmlns:v="urn:schemas-microsoft-com:vml" xmlns:o="urn:schemas-microsoft-com:office:office" xmlns:dgm="http://schemas.openxmlformats.org/drawingml/2006/diagram" xmlns:c="http://schemas.openxmlformats.org/drawingml/2006/chart" xmlns:mv="urn:schemas-microsoft-com:mac:vml" xmlns:mc="http://schemas.openxmlformats.org/markup-compatibility/2006" xmlns="" commentPostId="AAAAsEWYE8s"/>
+        <go:slidesCustomData xmlns="" xmlns:mc="http://schemas.openxmlformats.org/markup-compatibility/2006" xmlns:mv="urn:schemas-microsoft-com:mac:vml" xmlns:c="http://schemas.openxmlformats.org/drawingml/2006/chart" xmlns:dgm="http://schemas.openxmlformats.org/drawingml/2006/diagram" xmlns:o="urn:schemas-microsoft-com:office:office" xmlns:v="urn:schemas-microsoft-com:vml" xmlns:pvml="urn:schemas-microsoft-com:office:powerpoint" xmlns:com="http://schemas.openxmlformats.org/drawingml/2006/compatibility" xmlns:p14="http://schemas.microsoft.com/office/powerpoint/2010/main" xmlns:p15="http://schemas.microsoft.com/office/powerpoint/2012/main" xmlns:ahyp="http://schemas.microsoft.com/office/drawing/2018/hyperlinkcolor" xmlns:go="http://customooxmlschemas.google.com/" commentPostId="AAAAsEWYE8s"/>
       </p:ext>
     </p:extLst>
   </p:cm>
@@ -3810,6 +3811,175 @@
         </p:txBody>
       </p:sp>
     </p:spTree>
+  </p:cSld>
+  <p:clrMapOvr>
+    <a:masterClrMapping/>
+  </p:clrMapOvr>
+</p:notes>
+</file>
+
+<file path=ppt/notesSlides/notesSlide24.xml><?xml version="1.0" encoding="utf-8"?>
+<p:notes xmlns:a="http://schemas.openxmlformats.org/drawingml/2006/main" xmlns:r="http://schemas.openxmlformats.org/officeDocument/2006/relationships" xmlns:p="http://schemas.openxmlformats.org/presentationml/2006/main" showMasterSp="0" showMasterPhAnim="0">
+  <p:cSld>
+    <p:spTree>
+      <p:nvGrpSpPr>
+        <p:cNvPr id="1" name="Shape 375"/>
+        <p:cNvGrpSpPr/>
+        <p:nvPr/>
+      </p:nvGrpSpPr>
+      <p:grpSpPr>
+        <a:xfrm>
+          <a:off x="0" y="0"/>
+          <a:ext cx="0" cy="0"/>
+          <a:chOff x="0" y="0"/>
+          <a:chExt cx="0" cy="0"/>
+        </a:xfrm>
+      </p:grpSpPr>
+      <p:sp>
+        <p:nvSpPr>
+          <p:cNvPr id="376" name="Google Shape;376;p19:notes"/>
+          <p:cNvSpPr>
+            <a:spLocks noGrp="1" noRot="1" noChangeAspect="1"/>
+          </p:cNvSpPr>
+          <p:nvPr>
+            <p:ph type="sldImg" idx="2"/>
+          </p:nvPr>
+        </p:nvSpPr>
+        <p:spPr>
+          <a:xfrm>
+            <a:off x="685800" y="1143000"/>
+            <a:ext cx="5486400" cy="3086100"/>
+          </a:xfrm>
+          <a:custGeom>
+            <a:avLst/>
+            <a:gdLst/>
+            <a:ahLst/>
+            <a:cxnLst/>
+            <a:rect l="l" t="t" r="r" b="b"/>
+            <a:pathLst>
+              <a:path w="120000" h="120000" extrusionOk="0">
+                <a:moveTo>
+                  <a:pt x="0" y="0"/>
+                </a:moveTo>
+                <a:lnTo>
+                  <a:pt x="120000" y="0"/>
+                </a:lnTo>
+                <a:lnTo>
+                  <a:pt x="120000" y="120000"/>
+                </a:lnTo>
+                <a:lnTo>
+                  <a:pt x="0" y="120000"/>
+                </a:lnTo>
+                <a:close/>
+              </a:path>
+            </a:pathLst>
+          </a:custGeom>
+          <a:noFill/>
+          <a:ln w="12700" cap="flat" cmpd="sng">
+            <a:solidFill>
+              <a:srgbClr val="000000"/>
+            </a:solidFill>
+            <a:prstDash val="solid"/>
+            <a:round/>
+            <a:headEnd type="none" w="sm" len="sm"/>
+            <a:tailEnd type="none" w="sm" len="sm"/>
+          </a:ln>
+        </p:spPr>
+      </p:sp>
+      <p:sp>
+        <p:nvSpPr>
+          <p:cNvPr id="377" name="Google Shape;377;p19:notes"/>
+          <p:cNvSpPr txBox="1">
+            <a:spLocks noGrp="1"/>
+          </p:cNvSpPr>
+          <p:nvPr>
+            <p:ph type="body" idx="1"/>
+          </p:nvPr>
+        </p:nvSpPr>
+        <p:spPr>
+          <a:xfrm>
+            <a:off x="685800" y="4400550"/>
+            <a:ext cx="5486400" cy="3600450"/>
+          </a:xfrm>
+          <a:prstGeom prst="rect">
+            <a:avLst/>
+          </a:prstGeom>
+          <a:noFill/>
+          <a:ln>
+            <a:noFill/>
+          </a:ln>
+        </p:spPr>
+        <p:txBody>
+          <a:bodyPr spcFirstLastPara="1" wrap="square" lIns="91425" tIns="45700" rIns="91425" bIns="45700" anchor="t" anchorCtr="0">
+            <a:noAutofit/>
+          </a:bodyPr>
+          <a:lstStyle/>
+          <a:p>
+            <a:pPr marL="0" lvl="0" indent="0" algn="l" rtl="0">
+              <a:spcBef>
+                <a:spcPts val="0"/>
+              </a:spcBef>
+              <a:spcAft>
+                <a:spcPts val="0"/>
+              </a:spcAft>
+              <a:buNone/>
+            </a:pPr>
+            <a:endParaRPr/>
+          </a:p>
+        </p:txBody>
+      </p:sp>
+      <p:sp>
+        <p:nvSpPr>
+          <p:cNvPr id="378" name="Google Shape;378;p19:notes"/>
+          <p:cNvSpPr txBox="1">
+            <a:spLocks noGrp="1"/>
+          </p:cNvSpPr>
+          <p:nvPr>
+            <p:ph type="sldNum" idx="12"/>
+          </p:nvPr>
+        </p:nvSpPr>
+        <p:spPr>
+          <a:xfrm>
+            <a:off x="3884613" y="8685213"/>
+            <a:ext cx="2971800" cy="458787"/>
+          </a:xfrm>
+          <a:prstGeom prst="rect">
+            <a:avLst/>
+          </a:prstGeom>
+          <a:noFill/>
+          <a:ln>
+            <a:noFill/>
+          </a:ln>
+        </p:spPr>
+        <p:txBody>
+          <a:bodyPr spcFirstLastPara="1" wrap="square" lIns="91425" tIns="45700" rIns="91425" bIns="45700" anchor="b" anchorCtr="0">
+            <a:noAutofit/>
+          </a:bodyPr>
+          <a:lstStyle/>
+          <a:p>
+            <a:pPr marL="0" lvl="0" indent="0" algn="r" rtl="0">
+              <a:spcBef>
+                <a:spcPts val="0"/>
+              </a:spcBef>
+              <a:spcAft>
+                <a:spcPts val="0"/>
+              </a:spcAft>
+              <a:buNone/>
+            </a:pPr>
+            <a:fld id="{00000000-1234-1234-1234-123412341234}" type="slidenum">
+              <a:rPr lang="en-US"/>
+              <a:t>24</a:t>
+            </a:fld>
+            <a:endParaRPr/>
+          </a:p>
+        </p:txBody>
+      </p:sp>
+    </p:spTree>
+    <p:extLst>
+      <p:ext uri="{BB962C8B-B14F-4D97-AF65-F5344CB8AC3E}">
+        <p14:creationId xmlns:p14="http://schemas.microsoft.com/office/powerpoint/2010/main" val="2304082788"/>
+      </p:ext>
+    </p:extLst>
   </p:cSld>
   <p:clrMapOvr>
     <a:masterClrMapping/>
@@ -22621,6 +22791,334 @@
         </p:txBody>
       </p:sp>
     </p:spTree>
+  </p:cSld>
+  <p:clrMapOvr>
+    <a:masterClrMapping/>
+  </p:clrMapOvr>
+</p:sld>
+</file>
+
+<file path=ppt/slides/slide24.xml><?xml version="1.0" encoding="utf-8"?>
+<p:sld xmlns:a="http://schemas.openxmlformats.org/drawingml/2006/main" xmlns:r="http://schemas.openxmlformats.org/officeDocument/2006/relationships" xmlns:p="http://schemas.openxmlformats.org/presentationml/2006/main">
+  <p:cSld>
+    <p:bg>
+      <p:bgPr>
+        <a:solidFill>
+          <a:schemeClr val="lt1"/>
+        </a:solidFill>
+        <a:effectLst/>
+      </p:bgPr>
+    </p:bg>
+    <p:spTree>
+      <p:nvGrpSpPr>
+        <p:cNvPr id="1" name="Shape 379"/>
+        <p:cNvGrpSpPr/>
+        <p:nvPr/>
+      </p:nvGrpSpPr>
+      <p:grpSpPr>
+        <a:xfrm>
+          <a:off x="0" y="0"/>
+          <a:ext cx="0" cy="0"/>
+          <a:chOff x="0" y="0"/>
+          <a:chExt cx="0" cy="0"/>
+        </a:xfrm>
+      </p:grpSpPr>
+      <p:sp>
+        <p:nvSpPr>
+          <p:cNvPr id="380" name="Google Shape;380;p19"/>
+          <p:cNvSpPr/>
+          <p:nvPr/>
+        </p:nvSpPr>
+        <p:spPr>
+          <a:xfrm>
+            <a:off x="0" y="0"/>
+            <a:ext cx="12192000" cy="6858000"/>
+          </a:xfrm>
+          <a:prstGeom prst="rect">
+            <a:avLst/>
+          </a:prstGeom>
+          <a:solidFill>
+            <a:schemeClr val="lt1"/>
+          </a:solidFill>
+          <a:ln>
+            <a:noFill/>
+          </a:ln>
+        </p:spPr>
+        <p:txBody>
+          <a:bodyPr spcFirstLastPara="1" wrap="square" lIns="91425" tIns="45700" rIns="91425" bIns="45700" anchor="ctr" anchorCtr="0">
+            <a:noAutofit/>
+          </a:bodyPr>
+          <a:lstStyle/>
+          <a:p>
+            <a:pPr marL="0" marR="0" lvl="0" indent="0" algn="ctr" rtl="0">
+              <a:spcBef>
+                <a:spcPts val="0"/>
+              </a:spcBef>
+              <a:spcAft>
+                <a:spcPts val="0"/>
+              </a:spcAft>
+              <a:buNone/>
+            </a:pPr>
+            <a:endParaRPr sz="1800" b="0" i="0" u="none" strike="noStrike" cap="none">
+              <a:solidFill>
+                <a:schemeClr val="lt1"/>
+              </a:solidFill>
+              <a:latin typeface="Calibri"/>
+              <a:ea typeface="Calibri"/>
+              <a:cs typeface="Calibri"/>
+              <a:sym typeface="Calibri"/>
+            </a:endParaRPr>
+          </a:p>
+        </p:txBody>
+      </p:sp>
+      <p:sp>
+        <p:nvSpPr>
+          <p:cNvPr id="381" name="Google Shape;381;p19"/>
+          <p:cNvSpPr/>
+          <p:nvPr/>
+        </p:nvSpPr>
+        <p:spPr>
+          <a:xfrm flipH="1">
+            <a:off x="-3" y="-1"/>
+            <a:ext cx="12192000" cy="1590600"/>
+          </a:xfrm>
+          <a:prstGeom prst="rect">
+            <a:avLst/>
+          </a:prstGeom>
+          <a:gradFill>
+            <a:gsLst>
+              <a:gs pos="0">
+                <a:srgbClr val="000000"/>
+              </a:gs>
+              <a:gs pos="100000">
+                <a:srgbClr val="2F5496"/>
+              </a:gs>
+            </a:gsLst>
+            <a:lin ang="8400134" scaled="0"/>
+          </a:gradFill>
+          <a:ln>
+            <a:noFill/>
+          </a:ln>
+        </p:spPr>
+        <p:txBody>
+          <a:bodyPr spcFirstLastPara="1" wrap="square" lIns="91425" tIns="45700" rIns="91425" bIns="45700" anchor="ctr" anchorCtr="0">
+            <a:noAutofit/>
+          </a:bodyPr>
+          <a:lstStyle/>
+          <a:p>
+            <a:pPr marL="0" marR="0" lvl="0" indent="0" algn="ctr" rtl="0">
+              <a:spcBef>
+                <a:spcPts val="0"/>
+              </a:spcBef>
+              <a:spcAft>
+                <a:spcPts val="0"/>
+              </a:spcAft>
+              <a:buNone/>
+            </a:pPr>
+            <a:endParaRPr sz="1800" b="0" i="0" u="none" strike="noStrike" cap="none">
+              <a:solidFill>
+                <a:schemeClr val="lt1"/>
+              </a:solidFill>
+              <a:latin typeface="Calibri"/>
+              <a:ea typeface="Calibri"/>
+              <a:cs typeface="Calibri"/>
+              <a:sym typeface="Calibri"/>
+            </a:endParaRPr>
+          </a:p>
+        </p:txBody>
+      </p:sp>
+      <p:sp>
+        <p:nvSpPr>
+          <p:cNvPr id="382" name="Google Shape;382;p19"/>
+          <p:cNvSpPr/>
+          <p:nvPr/>
+        </p:nvSpPr>
+        <p:spPr>
+          <a:xfrm rot="10800000" flipH="1">
+            <a:off x="-3" y="142"/>
+            <a:ext cx="8115300" cy="1590600"/>
+          </a:xfrm>
+          <a:prstGeom prst="rect">
+            <a:avLst/>
+          </a:prstGeom>
+          <a:gradFill>
+            <a:gsLst>
+              <a:gs pos="0">
+                <a:srgbClr val="4472C4">
+                  <a:alpha val="0"/>
+                </a:srgbClr>
+              </a:gs>
+              <a:gs pos="20000">
+                <a:srgbClr val="4472C4">
+                  <a:alpha val="0"/>
+                </a:srgbClr>
+              </a:gs>
+              <a:gs pos="100000">
+                <a:srgbClr val="1F3864">
+                  <a:alpha val="54901"/>
+                </a:srgbClr>
+              </a:gs>
+            </a:gsLst>
+            <a:lin ang="13800146" scaled="0"/>
+          </a:gradFill>
+          <a:ln>
+            <a:noFill/>
+          </a:ln>
+        </p:spPr>
+        <p:txBody>
+          <a:bodyPr spcFirstLastPara="1" wrap="square" lIns="91425" tIns="45700" rIns="91425" bIns="45700" anchor="ctr" anchorCtr="0">
+            <a:noAutofit/>
+          </a:bodyPr>
+          <a:lstStyle/>
+          <a:p>
+            <a:pPr marL="0" marR="0" lvl="0" indent="0" algn="ctr" rtl="0">
+              <a:spcBef>
+                <a:spcPts val="0"/>
+              </a:spcBef>
+              <a:spcAft>
+                <a:spcPts val="0"/>
+              </a:spcAft>
+              <a:buNone/>
+            </a:pPr>
+            <a:endParaRPr sz="1800" b="0" i="0" u="none" strike="noStrike" cap="none">
+              <a:solidFill>
+                <a:schemeClr val="lt1"/>
+              </a:solidFill>
+              <a:latin typeface="Calibri"/>
+              <a:ea typeface="Calibri"/>
+              <a:cs typeface="Calibri"/>
+              <a:sym typeface="Calibri"/>
+            </a:endParaRPr>
+          </a:p>
+        </p:txBody>
+      </p:sp>
+      <p:sp>
+        <p:nvSpPr>
+          <p:cNvPr id="383" name="Google Shape;383;p19"/>
+          <p:cNvSpPr txBox="1">
+            <a:spLocks noGrp="1"/>
+          </p:cNvSpPr>
+          <p:nvPr>
+            <p:ph type="title"/>
+          </p:nvPr>
+        </p:nvSpPr>
+        <p:spPr>
+          <a:xfrm>
+            <a:off x="1371599" y="294538"/>
+            <a:ext cx="9895951" cy="1033669"/>
+          </a:xfrm>
+          <a:prstGeom prst="rect">
+            <a:avLst/>
+          </a:prstGeom>
+          <a:noFill/>
+          <a:ln>
+            <a:noFill/>
+          </a:ln>
+        </p:spPr>
+        <p:txBody>
+          <a:bodyPr spcFirstLastPara="1" wrap="square" lIns="91425" tIns="45700" rIns="91425" bIns="45700" anchor="ctr" anchorCtr="0">
+            <a:normAutofit/>
+          </a:bodyPr>
+          <a:lstStyle/>
+          <a:p>
+            <a:pPr marL="0" lvl="0" indent="0" algn="l" rtl="0">
+              <a:lnSpc>
+                <a:spcPct val="90000"/>
+              </a:lnSpc>
+              <a:spcBef>
+                <a:spcPts val="0"/>
+              </a:spcBef>
+              <a:spcAft>
+                <a:spcPts val="0"/>
+              </a:spcAft>
+              <a:buClr>
+                <a:srgbClr val="FFFFFF"/>
+              </a:buClr>
+              <a:buSzPts val="4000"/>
+              <a:buFont typeface="Calibri"/>
+              <a:buNone/>
+            </a:pPr>
+            <a:r>
+              <a:rPr lang="en-US" sz="4000" dirty="0">
+                <a:solidFill>
+                  <a:srgbClr val="FFFFFF"/>
+                </a:solidFill>
+              </a:rPr>
+              <a:t>Thank You</a:t>
+            </a:r>
+            <a:endParaRPr dirty="0"/>
+          </a:p>
+        </p:txBody>
+      </p:sp>
+      <p:sp>
+        <p:nvSpPr>
+          <p:cNvPr id="384" name="Google Shape;384;p19"/>
+          <p:cNvSpPr txBox="1">
+            <a:spLocks noGrp="1"/>
+          </p:cNvSpPr>
+          <p:nvPr>
+            <p:ph type="body" idx="1"/>
+          </p:nvPr>
+        </p:nvSpPr>
+        <p:spPr>
+          <a:xfrm>
+            <a:off x="1371599" y="2318197"/>
+            <a:ext cx="9724031" cy="3683358"/>
+          </a:xfrm>
+          <a:prstGeom prst="rect">
+            <a:avLst/>
+          </a:prstGeom>
+          <a:noFill/>
+          <a:ln>
+            <a:noFill/>
+          </a:ln>
+        </p:spPr>
+        <p:txBody>
+          <a:bodyPr spcFirstLastPara="1" wrap="square" lIns="91425" tIns="45700" rIns="91425" bIns="45700" anchor="ctr" anchorCtr="0">
+            <a:normAutofit/>
+          </a:bodyPr>
+          <a:lstStyle/>
+          <a:p>
+            <a:pPr marL="0" lvl="0" indent="0" algn="l" rtl="0">
+              <a:lnSpc>
+                <a:spcPct val="90000"/>
+              </a:lnSpc>
+              <a:spcBef>
+                <a:spcPts val="1000"/>
+              </a:spcBef>
+              <a:spcAft>
+                <a:spcPts val="0"/>
+              </a:spcAft>
+              <a:buClr>
+                <a:schemeClr val="dk1"/>
+              </a:buClr>
+              <a:buSzPts val="2000"/>
+              <a:buNone/>
+            </a:pPr>
+            <a:r>
+              <a:rPr lang="en-US" sz="4000" dirty="0">
+                <a:latin typeface="Arial"/>
+                <a:ea typeface="Arial"/>
+                <a:cs typeface="Arial"/>
+                <a:sym typeface="Arial"/>
+              </a:rPr>
+              <a:t>Questions ?</a:t>
+            </a:r>
+            <a:endParaRPr sz="4000" dirty="0">
+              <a:latin typeface="Arial"/>
+              <a:ea typeface="Arial"/>
+              <a:cs typeface="Arial"/>
+              <a:sym typeface="Arial"/>
+            </a:endParaRPr>
+          </a:p>
+        </p:txBody>
+      </p:sp>
+    </p:spTree>
+    <p:extLst>
+      <p:ext uri="{BB962C8B-B14F-4D97-AF65-F5344CB8AC3E}">
+        <p14:creationId xmlns:p14="http://schemas.microsoft.com/office/powerpoint/2010/main" val="1340594635"/>
+      </p:ext>
+    </p:extLst>
   </p:cSld>
   <p:clrMapOvr>
     <a:masterClrMapping/>

</xml_diff>